<commit_message>
Update slides in m02
</commit_message>
<xml_diff>
--- a/Slides/Module 02.1 Requirements Analysis.pptx
+++ b/Slides/Module 02.1 Requirements Analysis.pptx
@@ -3651,7 +3651,7 @@
           <a:p>
             <a:fld id="{7C7E5181-6CF5-45F7-A87A-E0E0B1FD7549}" type="datetimeFigureOut">
               <a:rPr lang="en-US" smtClean="0"/>
-              <a:t>1/1/26</a:t>
+              <a:t>1/3/26</a:t>
             </a:fld>
             <a:endParaRPr lang="en-US"/>
           </a:p>
@@ -5817,7 +5817,7 @@
           <a:p>
             <a:fld id="{5D2A64DE-480B-420F-9649-4F8E696E08E0}" type="datetime1">
               <a:rPr lang="en-US" smtClean="0"/>
-              <a:t>1/1/26</a:t>
+              <a:t>1/3/26</a:t>
             </a:fld>
             <a:endParaRPr lang="en-US"/>
           </a:p>
@@ -6141,7 +6141,7 @@
           <a:p>
             <a:fld id="{EA476A42-A091-4468-A075-64A31BE59948}" type="datetime1">
               <a:rPr lang="en-US" smtClean="0"/>
-              <a:t>1/1/26</a:t>
+              <a:t>1/3/26</a:t>
             </a:fld>
             <a:endParaRPr lang="en-US"/>
           </a:p>
@@ -6339,7 +6339,7 @@
           <a:p>
             <a:fld id="{0D3616D0-8311-4107-9726-6B805E7D05BA}" type="datetime1">
               <a:rPr lang="en-US" smtClean="0"/>
-              <a:t>1/1/26</a:t>
+              <a:t>1/3/26</a:t>
             </a:fld>
             <a:endParaRPr lang="en-US"/>
           </a:p>
@@ -6547,7 +6547,7 @@
           <a:p>
             <a:fld id="{3BC2557A-5C88-417A-A763-5AC779462A5F}" type="datetime1">
               <a:rPr lang="en-US" smtClean="0"/>
-              <a:t>1/1/26</a:t>
+              <a:t>1/3/26</a:t>
             </a:fld>
             <a:endParaRPr lang="en-US"/>
           </a:p>
@@ -6969,7 +6969,7 @@
           <a:p>
             <a:fld id="{07C7BFD4-467E-4EDE-93EA-052F5B39A4E5}" type="datetime1">
               <a:rPr lang="en-US" smtClean="0"/>
-              <a:t>1/1/26</a:t>
+              <a:t>1/3/26</a:t>
             </a:fld>
             <a:endParaRPr lang="en-US"/>
           </a:p>
@@ -7219,7 +7219,7 @@
           <a:p>
             <a:fld id="{07C7BFD4-467E-4EDE-93EA-052F5B39A4E5}" type="datetime1">
               <a:rPr lang="en-US" smtClean="0"/>
-              <a:t>1/1/26</a:t>
+              <a:t>1/3/26</a:t>
             </a:fld>
             <a:endParaRPr lang="en-US"/>
           </a:p>
@@ -7401,7 +7401,7 @@
           <a:p>
             <a:fld id="{109E55A0-C911-4F03-82FC-7E5926047D46}" type="datetime1">
               <a:rPr lang="en-US" smtClean="0"/>
-              <a:t>1/1/26</a:t>
+              <a:t>1/3/26</a:t>
             </a:fld>
             <a:endParaRPr lang="en-US"/>
           </a:p>
@@ -7714,7 +7714,7 @@
           <a:p>
             <a:fld id="{A533CBE2-D5BE-47AC-ADC2-9CDFC1D0CF90}" type="datetime1">
               <a:rPr lang="en-US" smtClean="0"/>
-              <a:t>1/1/26</a:t>
+              <a:t>1/3/26</a:t>
             </a:fld>
             <a:endParaRPr lang="en-US"/>
           </a:p>
@@ -8015,7 +8015,7 @@
           <a:p>
             <a:fld id="{39B7EDB1-CE74-4951-85A2-0B01C2128E28}" type="datetime1">
               <a:rPr lang="en-US" smtClean="0"/>
-              <a:t>1/1/26</a:t>
+              <a:t>1/3/26</a:t>
             </a:fld>
             <a:endParaRPr lang="en-US"/>
           </a:p>
@@ -8463,7 +8463,7 @@
           <a:p>
             <a:fld id="{2BC7EB92-A5C2-4807-A9DC-9EDE6CBFB241}" type="datetime1">
               <a:rPr lang="en-US" smtClean="0"/>
-              <a:t>1/1/26</a:t>
+              <a:t>1/3/26</a:t>
             </a:fld>
             <a:endParaRPr lang="en-US"/>
           </a:p>
@@ -8576,7 +8576,7 @@
           <a:p>
             <a:fld id="{2B7B7EE0-7771-4CD5-9B2B-3550753A54A1}" type="datetime1">
               <a:rPr lang="en-US" smtClean="0"/>
-              <a:t>1/1/26</a:t>
+              <a:t>1/3/26</a:t>
             </a:fld>
             <a:endParaRPr lang="en-US"/>
           </a:p>
@@ -8887,7 +8887,7 @@
           <a:p>
             <a:fld id="{F8B318B3-0E87-4416-A9B8-D891968C2727}" type="datetime1">
               <a:rPr lang="en-US" smtClean="0"/>
-              <a:t>1/1/26</a:t>
+              <a:t>1/3/26</a:t>
             </a:fld>
             <a:endParaRPr lang="en-US"/>
           </a:p>
@@ -9128,7 +9128,7 @@
           <a:p>
             <a:fld id="{54D997E8-DDEE-43F1-8D9B-F8A1E11DE488}" type="datetime1">
               <a:rPr lang="en-US" smtClean="0"/>
-              <a:t>1/1/26</a:t>
+              <a:t>1/3/26</a:t>
             </a:fld>
             <a:endParaRPr lang="en-US"/>
           </a:p>
@@ -9845,14 +9845,7 @@
           <a:p>
             <a:r>
               <a:rPr lang="en-US" dirty="0"/>
-              <a:t>Requirements Gathering </a:t>
-            </a:r>
-            <a:br>
-              <a:rPr lang="en-US" dirty="0"/>
-            </a:br>
-            <a:r>
-              <a:rPr lang="en-US" dirty="0"/>
-              <a:t>Includes Prioritizing User Stories</a:t>
+              <a:t>Requirements Gathering Includes Prioritizing User Stories</a:t>
             </a:r>
           </a:p>
         </p:txBody>
@@ -9903,7 +9896,7 @@
             </a:r>
             <a:r>
               <a:rPr lang="en-US" dirty="0"/>
-              <a:t>within a user story. This is a complex activity that requires negotiation</a:t>
+              <a:t>within a user story. </a:t>
             </a:r>
           </a:p>
           <a:p>
@@ -9925,7 +9918,7 @@
             </a:r>
             <a:r>
               <a:rPr lang="en-US" dirty="0"/>
-              <a:t>that is constrained by resources (budget, time, personnel) and multiple (competing or incompatible) ideas about what’s important</a:t>
+              <a:t>that is constrained by resources (budget, time, personnel) and multiple (competing or incompatible) ideas about what’s important.</a:t>
             </a:r>
           </a:p>
         </p:txBody>

</xml_diff>

<commit_message>
minor tweaks to font sizes
</commit_message>
<xml_diff>
--- a/Slides/Module 02.1 Requirements Analysis.pptx
+++ b/Slides/Module 02.1 Requirements Analysis.pptx
@@ -1473,8 +1473,8 @@
     <dgm:cxn modelId="{0D619939-DF3D-4D20-BB53-412AF78EA558}" type="presOf" srcId="{ABB0E679-4682-422A-B4B3-34D44CC4C90C}" destId="{BBEC7333-A5CB-4B43-A34A-870E516E4DD6}" srcOrd="0" destOrd="0" presId="urn:microsoft.com/office/officeart/2018/2/layout/IconVerticalSolidList"/>
     <dgm:cxn modelId="{07AC9C4A-377E-4379-B550-8DB49E3862F9}" srcId="{ABB0E679-4682-422A-B4B3-34D44CC4C90C}" destId="{8859CDF6-BBF5-4A76-8A76-407071531CB6}" srcOrd="2" destOrd="0" parTransId="{4553293F-765F-468C-A52D-17712ED16F1F}" sibTransId="{CD3D3010-EDC9-481C-A822-9AFA251D0BAD}"/>
     <dgm:cxn modelId="{F7C5F74B-BB11-4F28-9F7E-23FE778011DC}" type="presOf" srcId="{79B77230-D940-49CC-AF47-BF1D40797D89}" destId="{D527155E-0657-496B-926B-6BBC0B628D07}" srcOrd="0" destOrd="0" presId="urn:microsoft.com/office/officeart/2018/2/layout/IconVerticalSolidList"/>
+    <dgm:cxn modelId="{BBA2886E-1FC2-4FFE-BF42-BABB70DB9D54}" srcId="{ABB0E679-4682-422A-B4B3-34D44CC4C90C}" destId="{79B77230-D940-49CC-AF47-BF1D40797D89}" srcOrd="0" destOrd="0" parTransId="{C50558CC-69DA-4C28-8CB9-2982E9088524}" sibTransId="{01A261DD-4242-4987-8459-53BA826F65E4}"/>
     <dgm:cxn modelId="{16B49D51-0857-4A44-AD1A-0C1006418460}" srcId="{7851135E-E593-49EB-9C66-FB8F80DCC8EB}" destId="{0F25331F-8FB8-4E3A-87F2-3F285D74EB32}" srcOrd="2" destOrd="0" parTransId="{324E124D-8500-4C04-A0BA-6F6C2D553D81}" sibTransId="{4716CEE8-C882-4DFA-8AAE-CB3797F9F69F}"/>
-    <dgm:cxn modelId="{BBA2886E-1FC2-4FFE-BF42-BABB70DB9D54}" srcId="{ABB0E679-4682-422A-B4B3-34D44CC4C90C}" destId="{79B77230-D940-49CC-AF47-BF1D40797D89}" srcOrd="0" destOrd="0" parTransId="{C50558CC-69DA-4C28-8CB9-2982E9088524}" sibTransId="{01A261DD-4242-4987-8459-53BA826F65E4}"/>
     <dgm:cxn modelId="{6F534F79-49C3-49F2-B767-CA8451407698}" type="presOf" srcId="{2CC7D121-8A41-44D9-89BD-244AA28A42A0}" destId="{D527155E-0657-496B-926B-6BBC0B628D07}" srcOrd="0" destOrd="1" presId="urn:microsoft.com/office/officeart/2018/2/layout/IconVerticalSolidList"/>
     <dgm:cxn modelId="{83B9F09E-EAE2-4CC8-ADD5-C1D9758C0071}" type="presOf" srcId="{A898EC3E-4F02-462D-8397-BC48F29AE81B}" destId="{4FB2F518-2BF4-4FD7-A56E-47F3A3918E17}" srcOrd="0" destOrd="0" presId="urn:microsoft.com/office/officeart/2018/2/layout/IconVerticalSolidList"/>
     <dgm:cxn modelId="{D9C411B4-474A-4FB0-9E9B-1E92A378E566}" srcId="{289B9B18-ED8C-4F8C-B57D-E359AFC29DCD}" destId="{A898EC3E-4F02-462D-8397-BC48F29AE81B}" srcOrd="0" destOrd="0" parTransId="{AD9DCD49-7708-4181-B664-3E4D3C91E37D}" sibTransId="{5F251CD8-B93E-4310-9598-EB0F0D698564}"/>
@@ -3651,7 +3651,7 @@
           <a:p>
             <a:fld id="{7C7E5181-6CF5-45F7-A87A-E0E0B1FD7549}" type="datetimeFigureOut">
               <a:rPr lang="en-US" smtClean="0"/>
-              <a:t>1/3/26</a:t>
+              <a:t>1/5/2026</a:t>
             </a:fld>
             <a:endParaRPr lang="en-US"/>
           </a:p>
@@ -4321,15 +4321,7 @@
             </a:pPr>
             <a:r>
               <a:rPr lang="en-US" dirty="0"/>
-              <a:t>Identify the stakeholders and value tensions. For e.g., the stakeholders here could be site users and site owners. Their interests may align or conflict. For e.g., site users may want to be anonymous, but site owners might want to monetize site usage by sharing personal usage data with advertisers. On the </a:t>
-            </a:r>
-            <a:r>
-              <a:rPr lang="en-US"/>
-              <a:t>other hand, </a:t>
-            </a:r>
-            <a:r>
-              <a:rPr lang="en-US" dirty="0"/>
-              <a:t>they may align if the site owners want to make accountability and transparently a core value of their operations.</a:t>
+              <a:t>Identify the stakeholders and value tensions. For e.g., the stakeholders here could be site users and site owners. Their interests may align or conflict. For e.g., site users may want to be anonymous, but site owners might want to monetize site usage by sharing personal usage data with advertisers. On the other hand, they may align if the site owners want to make accountability and transparently a core value of their operations.</a:t>
             </a:r>
           </a:p>
           <a:p>
@@ -5817,7 +5809,7 @@
           <a:p>
             <a:fld id="{5D2A64DE-480B-420F-9649-4F8E696E08E0}" type="datetime1">
               <a:rPr lang="en-US" smtClean="0"/>
-              <a:t>1/3/26</a:t>
+              <a:t>1/5/2026</a:t>
             </a:fld>
             <a:endParaRPr lang="en-US"/>
           </a:p>
@@ -6141,7 +6133,7 @@
           <a:p>
             <a:fld id="{EA476A42-A091-4468-A075-64A31BE59948}" type="datetime1">
               <a:rPr lang="en-US" smtClean="0"/>
-              <a:t>1/3/26</a:t>
+              <a:t>1/5/2026</a:t>
             </a:fld>
             <a:endParaRPr lang="en-US"/>
           </a:p>
@@ -6339,7 +6331,7 @@
           <a:p>
             <a:fld id="{0D3616D0-8311-4107-9726-6B805E7D05BA}" type="datetime1">
               <a:rPr lang="en-US" smtClean="0"/>
-              <a:t>1/3/26</a:t>
+              <a:t>1/5/2026</a:t>
             </a:fld>
             <a:endParaRPr lang="en-US"/>
           </a:p>
@@ -6547,7 +6539,7 @@
           <a:p>
             <a:fld id="{3BC2557A-5C88-417A-A763-5AC779462A5F}" type="datetime1">
               <a:rPr lang="en-US" smtClean="0"/>
-              <a:t>1/3/26</a:t>
+              <a:t>1/5/2026</a:t>
             </a:fld>
             <a:endParaRPr lang="en-US"/>
           </a:p>
@@ -6969,7 +6961,7 @@
           <a:p>
             <a:fld id="{07C7BFD4-467E-4EDE-93EA-052F5B39A4E5}" type="datetime1">
               <a:rPr lang="en-US" smtClean="0"/>
-              <a:t>1/3/26</a:t>
+              <a:t>1/5/2026</a:t>
             </a:fld>
             <a:endParaRPr lang="en-US"/>
           </a:p>
@@ -7219,7 +7211,7 @@
           <a:p>
             <a:fld id="{07C7BFD4-467E-4EDE-93EA-052F5B39A4E5}" type="datetime1">
               <a:rPr lang="en-US" smtClean="0"/>
-              <a:t>1/3/26</a:t>
+              <a:t>1/5/2026</a:t>
             </a:fld>
             <a:endParaRPr lang="en-US"/>
           </a:p>
@@ -7401,7 +7393,7 @@
           <a:p>
             <a:fld id="{109E55A0-C911-4F03-82FC-7E5926047D46}" type="datetime1">
               <a:rPr lang="en-US" smtClean="0"/>
-              <a:t>1/3/26</a:t>
+              <a:t>1/5/2026</a:t>
             </a:fld>
             <a:endParaRPr lang="en-US"/>
           </a:p>
@@ -7714,7 +7706,7 @@
           <a:p>
             <a:fld id="{A533CBE2-D5BE-47AC-ADC2-9CDFC1D0CF90}" type="datetime1">
               <a:rPr lang="en-US" smtClean="0"/>
-              <a:t>1/3/26</a:t>
+              <a:t>1/5/2026</a:t>
             </a:fld>
             <a:endParaRPr lang="en-US"/>
           </a:p>
@@ -8015,7 +8007,7 @@
           <a:p>
             <a:fld id="{39B7EDB1-CE74-4951-85A2-0B01C2128E28}" type="datetime1">
               <a:rPr lang="en-US" smtClean="0"/>
-              <a:t>1/3/26</a:t>
+              <a:t>1/5/2026</a:t>
             </a:fld>
             <a:endParaRPr lang="en-US"/>
           </a:p>
@@ -8463,7 +8455,7 @@
           <a:p>
             <a:fld id="{2BC7EB92-A5C2-4807-A9DC-9EDE6CBFB241}" type="datetime1">
               <a:rPr lang="en-US" smtClean="0"/>
-              <a:t>1/3/26</a:t>
+              <a:t>1/5/2026</a:t>
             </a:fld>
             <a:endParaRPr lang="en-US"/>
           </a:p>
@@ -8576,7 +8568,7 @@
           <a:p>
             <a:fld id="{2B7B7EE0-7771-4CD5-9B2B-3550753A54A1}" type="datetime1">
               <a:rPr lang="en-US" smtClean="0"/>
-              <a:t>1/3/26</a:t>
+              <a:t>1/5/2026</a:t>
             </a:fld>
             <a:endParaRPr lang="en-US"/>
           </a:p>
@@ -8887,7 +8879,7 @@
           <a:p>
             <a:fld id="{F8B318B3-0E87-4416-A9B8-D891968C2727}" type="datetime1">
               <a:rPr lang="en-US" smtClean="0"/>
-              <a:t>1/3/26</a:t>
+              <a:t>1/5/2026</a:t>
             </a:fld>
             <a:endParaRPr lang="en-US"/>
           </a:p>
@@ -9128,7 +9120,7 @@
           <a:p>
             <a:fld id="{54D997E8-DDEE-43F1-8D9B-F8A1E11DE488}" type="datetime1">
               <a:rPr lang="en-US" smtClean="0"/>
-              <a:t>1/3/26</a:t>
+              <a:t>1/5/2026</a:t>
             </a:fld>
             <a:endParaRPr lang="en-US"/>
           </a:p>
@@ -9845,7 +9837,7 @@
           <a:p>
             <a:r>
               <a:rPr lang="en-US" dirty="0"/>
-              <a:t>Requirements Gathering Includes Prioritizing User Stories</a:t>
+              <a:t>Requirements Gathering includes Prioritizing User Stories</a:t>
             </a:r>
           </a:p>
         </p:txBody>
@@ -10378,6 +10370,76 @@
               <a:t>11</a:t>
             </a:fld>
             <a:endParaRPr lang="en-US"/>
+          </a:p>
+        </p:txBody>
+      </p:sp>
+      <p:sp>
+        <p:nvSpPr>
+          <p:cNvPr id="7" name="TextBox 6">
+            <a:extLst>
+              <a:ext uri="{FF2B5EF4-FFF2-40B4-BE49-F238E27FC236}">
+                <a16:creationId xmlns:a16="http://schemas.microsoft.com/office/drawing/2014/main" id="{CF29CAEE-49A2-6956-85C0-E61589FACF89}"/>
+              </a:ext>
+            </a:extLst>
+          </p:cNvPr>
+          <p:cNvSpPr txBox="1"/>
+          <p:nvPr/>
+        </p:nvSpPr>
+        <p:spPr>
+          <a:xfrm>
+            <a:off x="97663" y="6356350"/>
+            <a:ext cx="6100762" cy="369332"/>
+          </a:xfrm>
+          <a:prstGeom prst="rect">
+            <a:avLst/>
+          </a:prstGeom>
+          <a:noFill/>
+          <a:ln w="12700" cap="flat" cmpd="sng" algn="ctr">
+            <a:noFill/>
+            <a:prstDash val="solid"/>
+            <a:miter lim="800000"/>
+          </a:ln>
+          <a:effectLst/>
+        </p:spPr>
+        <p:style>
+          <a:lnRef idx="2">
+            <a:schemeClr val="accent1">
+              <a:shade val="50000"/>
+            </a:schemeClr>
+          </a:lnRef>
+          <a:fillRef idx="1">
+            <a:schemeClr val="accent1"/>
+          </a:fillRef>
+          <a:effectRef idx="0">
+            <a:schemeClr val="accent1"/>
+          </a:effectRef>
+          <a:fontRef idx="minor">
+            <a:schemeClr val="lt1"/>
+          </a:fontRef>
+        </p:style>
+        <p:txBody>
+          <a:bodyPr wrap="square">
+            <a:spAutoFit/>
+          </a:bodyPr>
+          <a:lstStyle/>
+          <a:p>
+            <a:r>
+              <a:rPr lang="en-US" dirty="0">
+                <a:solidFill>
+                  <a:schemeClr val="tx1"/>
+                </a:solidFill>
+                <a:hlinkClick r:id="rId3"/>
+              </a:rPr>
+              <a:t>https://vsd.ccs.neu.edu/introduction/what-is-vsd/</a:t>
+            </a:r>
+            <a:r>
+              <a:rPr lang="en-US" dirty="0">
+                <a:solidFill>
+                  <a:schemeClr val="tx1"/>
+                </a:solidFill>
+              </a:rPr>
+              <a:t> </a:t>
+            </a:r>
           </a:p>
         </p:txBody>
       </p:sp>
@@ -11072,70 +11134,6 @@
             <a:r>
               <a:rPr lang="en-US" dirty="0"/>
               <a:t>Websites use them to obtain and manage user permission for using cookies.</a:t>
-            </a:r>
-          </a:p>
-        </p:txBody>
-      </p:sp>
-      <p:sp>
-        <p:nvSpPr>
-          <p:cNvPr id="7" name="Rectangle 6">
-            <a:extLst>
-              <a:ext uri="{FF2B5EF4-FFF2-40B4-BE49-F238E27FC236}">
-                <a16:creationId xmlns:a16="http://schemas.microsoft.com/office/drawing/2014/main" id="{B34C18CB-D004-428A-F501-7FEE682E18D0}"/>
-              </a:ext>
-            </a:extLst>
-          </p:cNvPr>
-          <p:cNvSpPr/>
-          <p:nvPr/>
-        </p:nvSpPr>
-        <p:spPr>
-          <a:xfrm>
-            <a:off x="8003005" y="6007840"/>
-            <a:ext cx="2743200" cy="681622"/>
-          </a:xfrm>
-          <a:prstGeom prst="rect">
-            <a:avLst/>
-          </a:prstGeom>
-          <a:solidFill>
-            <a:schemeClr val="accent2">
-              <a:lumMod val="20000"/>
-              <a:lumOff val="80000"/>
-            </a:schemeClr>
-          </a:solidFill>
-          <a:ln>
-            <a:solidFill>
-              <a:srgbClr val="0070C0"/>
-            </a:solidFill>
-          </a:ln>
-        </p:spPr>
-        <p:style>
-          <a:lnRef idx="2">
-            <a:schemeClr val="accent1">
-              <a:shade val="50000"/>
-            </a:schemeClr>
-          </a:lnRef>
-          <a:fillRef idx="1">
-            <a:schemeClr val="accent1"/>
-          </a:fillRef>
-          <a:effectRef idx="0">
-            <a:schemeClr val="accent1"/>
-          </a:effectRef>
-          <a:fontRef idx="minor">
-            <a:schemeClr val="lt1"/>
-          </a:fontRef>
-        </p:style>
-        <p:txBody>
-          <a:bodyPr rtlCol="0" anchor="ctr"/>
-          <a:lstStyle/>
-          <a:p>
-            <a:pPr algn="l"/>
-            <a:r>
-              <a:rPr lang="en-US" sz="2800" dirty="0">
-                <a:solidFill>
-                  <a:schemeClr val="tx1"/>
-                </a:solidFill>
-              </a:rPr>
-              <a:t>Read the tutorial!</a:t>
             </a:r>
           </a:p>
         </p:txBody>
@@ -14753,14 +14751,7 @@
           <a:p>
             <a:r>
               <a:rPr lang="en-US" dirty="0"/>
-              <a:t>Requirements Analysis </a:t>
-            </a:r>
-            <a:br>
-              <a:rPr lang="en-US" dirty="0"/>
-            </a:br>
-            <a:r>
-              <a:rPr lang="en-US" dirty="0"/>
-              <a:t>Connects High-Level Planning To User Stories</a:t>
+              <a:t>Requirements Analysis connects High-Level Planning To User Stories</a:t>
             </a:r>
           </a:p>
         </p:txBody>
@@ -17173,8 +17164,8 @@
         </p:blipFill>
         <p:spPr bwMode="auto">
           <a:xfrm>
-            <a:off x="2159000" y="1968500"/>
-            <a:ext cx="7874000" cy="2921000"/>
+            <a:off x="1159023" y="1743213"/>
+            <a:ext cx="9983159" cy="3703430"/>
           </a:xfrm>
           <a:prstGeom prst="rect">
             <a:avLst/>
@@ -17246,16 +17237,9 @@
                 <a:solidFill>
                   <a:schemeClr val="tx1"/>
                 </a:solidFill>
+                <a:hlinkClick r:id="rId4"/>
               </a:rPr>
-              <a:t>https://</a:t>
-            </a:r>
-            <a:r>
-              <a:rPr lang="en-US" dirty="0" err="1">
-                <a:solidFill>
-                  <a:schemeClr val="tx1"/>
-                </a:solidFill>
-              </a:rPr>
-              <a:t>en.wikipedia.org</a:t>
+              <a:t>https://en.wikipedia.org/wiki/Tree_swing_cartoon</a:t>
             </a:r>
             <a:r>
               <a:rPr lang="en-US" dirty="0">
@@ -17263,21 +17247,8 @@
                   <a:schemeClr val="tx1"/>
                 </a:solidFill>
               </a:rPr>
-              <a:t>/wiki/</a:t>
-            </a:r>
-            <a:r>
-              <a:rPr lang="en-US" dirty="0" err="1">
-                <a:solidFill>
-                  <a:schemeClr val="tx1"/>
-                </a:solidFill>
-              </a:rPr>
-              <a:t>Tree_swing_cartoon</a:t>
-            </a:r>
-            <a:endParaRPr lang="en-US" dirty="0">
-              <a:solidFill>
-                <a:schemeClr val="tx1"/>
-              </a:solidFill>
-            </a:endParaRPr>
+              <a:t> </a:t>
+            </a:r>
           </a:p>
         </p:txBody>
       </p:sp>
@@ -18106,14 +18077,7 @@
           <a:p>
             <a:r>
               <a:rPr lang="en-US" dirty="0"/>
-              <a:t>“Building the Right Thing”</a:t>
-            </a:r>
-            <a:br>
-              <a:rPr lang="en-US" dirty="0"/>
-            </a:br>
-            <a:r>
-              <a:rPr lang="en-US" dirty="0"/>
-              <a:t>Necessarily Involves Value Judgments</a:t>
+              <a:t>“Building the Right Thing” Necessarily involves Value Judgments</a:t>
             </a:r>
           </a:p>
         </p:txBody>

</xml_diff>